<commit_message>
Added the free 5GC analysis.
</commit_message>
<xml_diff>
--- a/doc/designDoc.pptx
+++ b/doc/designDoc.pptx
@@ -6,6 +6,8 @@
   </p:sldMasterIdLst>
   <p:sldIdLst>
     <p:sldId id="256" r:id="rId2"/>
+    <p:sldId id="257" r:id="rId3"/>
+    <p:sldId id="258" r:id="rId4"/>
   </p:sldIdLst>
   <p:sldSz cx="12192000" cy="6858000"/>
   <p:notesSz cx="6858000" cy="9144000"/>
@@ -104,6 +106,11 @@
       </a:defRPr>
     </a:lvl9pPr>
   </p:defaultTextStyle>
+  <p:extLst>
+    <p:ext uri="{EFAFB233-063F-42B5-8137-9DF3F51BA10A}">
+      <p15:sldGuideLst xmlns:p15="http://schemas.microsoft.com/office/powerpoint/2012/main"/>
+    </p:ext>
+  </p:extLst>
 </p:presentation>
 </file>
 
@@ -256,7 +263,7 @@
           <a:p>
             <a:fld id="{0DAE32F3-8C71-4326-BE9A-F6B54D4B4E6B}" type="datetimeFigureOut">
               <a:rPr lang="en-SG" smtClean="0"/>
-              <a:t>4/10/2022</a:t>
+              <a:t>26/10/2022</a:t>
             </a:fld>
             <a:endParaRPr lang="en-SG"/>
           </a:p>
@@ -456,7 +463,7 @@
           <a:p>
             <a:fld id="{0DAE32F3-8C71-4326-BE9A-F6B54D4B4E6B}" type="datetimeFigureOut">
               <a:rPr lang="en-SG" smtClean="0"/>
-              <a:t>4/10/2022</a:t>
+              <a:t>26/10/2022</a:t>
             </a:fld>
             <a:endParaRPr lang="en-SG"/>
           </a:p>
@@ -666,7 +673,7 @@
           <a:p>
             <a:fld id="{0DAE32F3-8C71-4326-BE9A-F6B54D4B4E6B}" type="datetimeFigureOut">
               <a:rPr lang="en-SG" smtClean="0"/>
-              <a:t>4/10/2022</a:t>
+              <a:t>26/10/2022</a:t>
             </a:fld>
             <a:endParaRPr lang="en-SG"/>
           </a:p>
@@ -866,7 +873,7 @@
           <a:p>
             <a:fld id="{0DAE32F3-8C71-4326-BE9A-F6B54D4B4E6B}" type="datetimeFigureOut">
               <a:rPr lang="en-SG" smtClean="0"/>
-              <a:t>4/10/2022</a:t>
+              <a:t>26/10/2022</a:t>
             </a:fld>
             <a:endParaRPr lang="en-SG"/>
           </a:p>
@@ -1142,7 +1149,7 @@
           <a:p>
             <a:fld id="{0DAE32F3-8C71-4326-BE9A-F6B54D4B4E6B}" type="datetimeFigureOut">
               <a:rPr lang="en-SG" smtClean="0"/>
-              <a:t>4/10/2022</a:t>
+              <a:t>26/10/2022</a:t>
             </a:fld>
             <a:endParaRPr lang="en-SG"/>
           </a:p>
@@ -1410,7 +1417,7 @@
           <a:p>
             <a:fld id="{0DAE32F3-8C71-4326-BE9A-F6B54D4B4E6B}" type="datetimeFigureOut">
               <a:rPr lang="en-SG" smtClean="0"/>
-              <a:t>4/10/2022</a:t>
+              <a:t>26/10/2022</a:t>
             </a:fld>
             <a:endParaRPr lang="en-SG"/>
           </a:p>
@@ -1825,7 +1832,7 @@
           <a:p>
             <a:fld id="{0DAE32F3-8C71-4326-BE9A-F6B54D4B4E6B}" type="datetimeFigureOut">
               <a:rPr lang="en-SG" smtClean="0"/>
-              <a:t>4/10/2022</a:t>
+              <a:t>26/10/2022</a:t>
             </a:fld>
             <a:endParaRPr lang="en-SG"/>
           </a:p>
@@ -1967,7 +1974,7 @@
           <a:p>
             <a:fld id="{0DAE32F3-8C71-4326-BE9A-F6B54D4B4E6B}" type="datetimeFigureOut">
               <a:rPr lang="en-SG" smtClean="0"/>
-              <a:t>4/10/2022</a:t>
+              <a:t>26/10/2022</a:t>
             </a:fld>
             <a:endParaRPr lang="en-SG"/>
           </a:p>
@@ -2080,7 +2087,7 @@
           <a:p>
             <a:fld id="{0DAE32F3-8C71-4326-BE9A-F6B54D4B4E6B}" type="datetimeFigureOut">
               <a:rPr lang="en-SG" smtClean="0"/>
-              <a:t>4/10/2022</a:t>
+              <a:t>26/10/2022</a:t>
             </a:fld>
             <a:endParaRPr lang="en-SG"/>
           </a:p>
@@ -2393,7 +2400,7 @@
           <a:p>
             <a:fld id="{0DAE32F3-8C71-4326-BE9A-F6B54D4B4E6B}" type="datetimeFigureOut">
               <a:rPr lang="en-SG" smtClean="0"/>
-              <a:t>4/10/2022</a:t>
+              <a:t>26/10/2022</a:t>
             </a:fld>
             <a:endParaRPr lang="en-SG"/>
           </a:p>
@@ -2682,7 +2689,7 @@
           <a:p>
             <a:fld id="{0DAE32F3-8C71-4326-BE9A-F6B54D4B4E6B}" type="datetimeFigureOut">
               <a:rPr lang="en-SG" smtClean="0"/>
-              <a:t>4/10/2022</a:t>
+              <a:t>26/10/2022</a:t>
             </a:fld>
             <a:endParaRPr lang="en-SG"/>
           </a:p>
@@ -2925,7 +2932,7 @@
           <a:p>
             <a:fld id="{0DAE32F3-8C71-4326-BE9A-F6B54D4B4E6B}" type="datetimeFigureOut">
               <a:rPr lang="en-SG" smtClean="0"/>
-              <a:t>4/10/2022</a:t>
+              <a:t>26/10/2022</a:t>
             </a:fld>
             <a:endParaRPr lang="en-SG"/>
           </a:p>
@@ -4081,6 +4088,1052 @@
 </p:sld>
 </file>
 
+<file path=ppt/slides/slide2.xml><?xml version="1.0" encoding="utf-8"?>
+<p:sld xmlns:a="http://schemas.openxmlformats.org/drawingml/2006/main" xmlns:r="http://schemas.openxmlformats.org/officeDocument/2006/relationships" xmlns:p="http://schemas.openxmlformats.org/presentationml/2006/main">
+  <p:cSld>
+    <p:spTree>
+      <p:nvGrpSpPr>
+        <p:cNvPr id="1" name=""/>
+        <p:cNvGrpSpPr/>
+        <p:nvPr/>
+      </p:nvGrpSpPr>
+      <p:grpSpPr>
+        <a:xfrm>
+          <a:off x="0" y="0"/>
+          <a:ext cx="0" cy="0"/>
+          <a:chOff x="0" y="0"/>
+          <a:chExt cx="0" cy="0"/>
+        </a:xfrm>
+      </p:grpSpPr>
+      <p:pic>
+        <p:nvPicPr>
+          <p:cNvPr id="5" name="Picture 4" descr="Diagram&#10;&#10;Description automatically generated">
+            <a:extLst>
+              <a:ext uri="{FF2B5EF4-FFF2-40B4-BE49-F238E27FC236}">
+                <a16:creationId xmlns:a16="http://schemas.microsoft.com/office/drawing/2014/main" id="{21DE0D15-CA3F-9435-68D7-CC646B61CB04}"/>
+              </a:ext>
+            </a:extLst>
+          </p:cNvPr>
+          <p:cNvPicPr>
+            <a:picLocks noChangeAspect="1"/>
+          </p:cNvPicPr>
+          <p:nvPr/>
+        </p:nvPicPr>
+        <p:blipFill>
+          <a:blip r:embed="rId2">
+            <a:extLst>
+              <a:ext uri="{28A0092B-C50C-407E-A947-70E740481C1C}">
+                <a14:useLocalDpi xmlns:a14="http://schemas.microsoft.com/office/drawing/2010/main" val="0"/>
+              </a:ext>
+            </a:extLst>
+          </a:blip>
+          <a:stretch>
+            <a:fillRect/>
+          </a:stretch>
+        </p:blipFill>
+        <p:spPr>
+          <a:xfrm>
+            <a:off x="424376" y="388437"/>
+            <a:ext cx="5437747" cy="3040563"/>
+          </a:xfrm>
+          <a:prstGeom prst="rect">
+            <a:avLst/>
+          </a:prstGeom>
+          <a:ln w="9525">
+            <a:solidFill>
+              <a:schemeClr val="tx1"/>
+            </a:solidFill>
+          </a:ln>
+        </p:spPr>
+      </p:pic>
+      <p:sp>
+        <p:nvSpPr>
+          <p:cNvPr id="6" name="Rectangle 5">
+            <a:extLst>
+              <a:ext uri="{FF2B5EF4-FFF2-40B4-BE49-F238E27FC236}">
+                <a16:creationId xmlns:a16="http://schemas.microsoft.com/office/drawing/2014/main" id="{E3611B47-A878-7424-F829-4CC73EBB8958}"/>
+              </a:ext>
+            </a:extLst>
+          </p:cNvPr>
+          <p:cNvSpPr/>
+          <p:nvPr/>
+        </p:nvSpPr>
+        <p:spPr>
+          <a:xfrm>
+            <a:off x="3009436" y="1739591"/>
+            <a:ext cx="1071910" cy="468350"/>
+          </a:xfrm>
+          <a:prstGeom prst="rect">
+            <a:avLst/>
+          </a:prstGeom>
+          <a:noFill/>
+          <a:ln w="28575">
+            <a:solidFill>
+              <a:srgbClr val="FF0000"/>
+            </a:solidFill>
+            <a:prstDash val="sysDash"/>
+          </a:ln>
+        </p:spPr>
+        <p:style>
+          <a:lnRef idx="2">
+            <a:schemeClr val="accent1">
+              <a:shade val="50000"/>
+            </a:schemeClr>
+          </a:lnRef>
+          <a:fillRef idx="1">
+            <a:schemeClr val="accent1"/>
+          </a:fillRef>
+          <a:effectRef idx="0">
+            <a:schemeClr val="accent1"/>
+          </a:effectRef>
+          <a:fontRef idx="minor">
+            <a:schemeClr val="lt1"/>
+          </a:fontRef>
+        </p:style>
+        <p:txBody>
+          <a:bodyPr rtlCol="0" anchor="ctr"/>
+          <a:lstStyle/>
+          <a:p>
+            <a:pPr algn="ctr"/>
+            <a:endParaRPr lang="en-SG" dirty="0"/>
+          </a:p>
+        </p:txBody>
+      </p:sp>
+      <p:cxnSp>
+        <p:nvCxnSpPr>
+          <p:cNvPr id="8" name="Straight Connector 7">
+            <a:extLst>
+              <a:ext uri="{FF2B5EF4-FFF2-40B4-BE49-F238E27FC236}">
+                <a16:creationId xmlns:a16="http://schemas.microsoft.com/office/drawing/2014/main" id="{B314E920-E8F6-3B05-39E6-BF980C4DD048}"/>
+              </a:ext>
+            </a:extLst>
+          </p:cNvPr>
+          <p:cNvCxnSpPr>
+            <a:cxnSpLocks/>
+          </p:cNvCxnSpPr>
+          <p:nvPr/>
+        </p:nvCxnSpPr>
+        <p:spPr>
+          <a:xfrm flipH="1">
+            <a:off x="424376" y="2207941"/>
+            <a:ext cx="3656970" cy="1689409"/>
+          </a:xfrm>
+          <a:prstGeom prst="line">
+            <a:avLst/>
+          </a:prstGeom>
+          <a:ln w="19050">
+            <a:solidFill>
+              <a:srgbClr val="FF0000"/>
+            </a:solidFill>
+          </a:ln>
+        </p:spPr>
+        <p:style>
+          <a:lnRef idx="1">
+            <a:schemeClr val="accent1"/>
+          </a:lnRef>
+          <a:fillRef idx="0">
+            <a:schemeClr val="accent1"/>
+          </a:fillRef>
+          <a:effectRef idx="0">
+            <a:schemeClr val="accent1"/>
+          </a:effectRef>
+          <a:fontRef idx="minor">
+            <a:schemeClr val="tx1"/>
+          </a:fontRef>
+        </p:style>
+      </p:cxnSp>
+      <p:cxnSp>
+        <p:nvCxnSpPr>
+          <p:cNvPr id="9" name="Straight Connector 8">
+            <a:extLst>
+              <a:ext uri="{FF2B5EF4-FFF2-40B4-BE49-F238E27FC236}">
+                <a16:creationId xmlns:a16="http://schemas.microsoft.com/office/drawing/2014/main" id="{64547502-E2EA-B717-5B41-2610D282609A}"/>
+              </a:ext>
+            </a:extLst>
+          </p:cNvPr>
+          <p:cNvCxnSpPr>
+            <a:cxnSpLocks/>
+          </p:cNvCxnSpPr>
+          <p:nvPr/>
+        </p:nvCxnSpPr>
+        <p:spPr>
+          <a:xfrm>
+            <a:off x="4081346" y="2207941"/>
+            <a:ext cx="1780777" cy="1689409"/>
+          </a:xfrm>
+          <a:prstGeom prst="line">
+            <a:avLst/>
+          </a:prstGeom>
+          <a:ln w="19050">
+            <a:solidFill>
+              <a:srgbClr val="FF0000"/>
+            </a:solidFill>
+          </a:ln>
+        </p:spPr>
+        <p:style>
+          <a:lnRef idx="1">
+            <a:schemeClr val="accent1"/>
+          </a:lnRef>
+          <a:fillRef idx="0">
+            <a:schemeClr val="accent1"/>
+          </a:fillRef>
+          <a:effectRef idx="0">
+            <a:schemeClr val="accent1"/>
+          </a:effectRef>
+          <a:fontRef idx="minor">
+            <a:schemeClr val="tx1"/>
+          </a:fontRef>
+        </p:style>
+      </p:cxnSp>
+      <p:pic>
+        <p:nvPicPr>
+          <p:cNvPr id="15" name="Picture 14">
+            <a:extLst>
+              <a:ext uri="{FF2B5EF4-FFF2-40B4-BE49-F238E27FC236}">
+                <a16:creationId xmlns:a16="http://schemas.microsoft.com/office/drawing/2014/main" id="{A6F005CB-B479-507D-9FF7-4F4389947273}"/>
+              </a:ext>
+            </a:extLst>
+          </p:cNvPr>
+          <p:cNvPicPr>
+            <a:picLocks noChangeAspect="1"/>
+          </p:cNvPicPr>
+          <p:nvPr/>
+        </p:nvPicPr>
+        <p:blipFill>
+          <a:blip r:embed="rId3"/>
+          <a:stretch>
+            <a:fillRect/>
+          </a:stretch>
+        </p:blipFill>
+        <p:spPr>
+          <a:xfrm>
+            <a:off x="424376" y="3897350"/>
+            <a:ext cx="5437747" cy="2792167"/>
+          </a:xfrm>
+          <a:prstGeom prst="rect">
+            <a:avLst/>
+          </a:prstGeom>
+          <a:ln w="12700">
+            <a:solidFill>
+              <a:schemeClr val="tx1"/>
+            </a:solidFill>
+          </a:ln>
+        </p:spPr>
+      </p:pic>
+      <p:sp>
+        <p:nvSpPr>
+          <p:cNvPr id="20" name="Rectangle 19">
+            <a:extLst>
+              <a:ext uri="{FF2B5EF4-FFF2-40B4-BE49-F238E27FC236}">
+                <a16:creationId xmlns:a16="http://schemas.microsoft.com/office/drawing/2014/main" id="{83B4641F-44D7-466B-6908-0410AA9808C7}"/>
+              </a:ext>
+            </a:extLst>
+          </p:cNvPr>
+          <p:cNvSpPr/>
+          <p:nvPr/>
+        </p:nvSpPr>
+        <p:spPr>
+          <a:xfrm>
+            <a:off x="4081346" y="6155473"/>
+            <a:ext cx="657922" cy="371706"/>
+          </a:xfrm>
+          <a:prstGeom prst="rect">
+            <a:avLst/>
+          </a:prstGeom>
+          <a:noFill/>
+          <a:ln w="28575">
+            <a:solidFill>
+              <a:srgbClr val="FF0000"/>
+            </a:solidFill>
+            <a:prstDash val="sysDash"/>
+          </a:ln>
+        </p:spPr>
+        <p:style>
+          <a:lnRef idx="2">
+            <a:schemeClr val="accent1">
+              <a:shade val="50000"/>
+            </a:schemeClr>
+          </a:lnRef>
+          <a:fillRef idx="1">
+            <a:schemeClr val="accent1"/>
+          </a:fillRef>
+          <a:effectRef idx="0">
+            <a:schemeClr val="accent1"/>
+          </a:effectRef>
+          <a:fontRef idx="minor">
+            <a:schemeClr val="lt1"/>
+          </a:fontRef>
+        </p:style>
+        <p:txBody>
+          <a:bodyPr rtlCol="0" anchor="ctr"/>
+          <a:lstStyle/>
+          <a:p>
+            <a:pPr algn="ctr"/>
+            <a:endParaRPr lang="en-SG" dirty="0"/>
+          </a:p>
+        </p:txBody>
+      </p:sp>
+      <p:cxnSp>
+        <p:nvCxnSpPr>
+          <p:cNvPr id="21" name="Straight Connector 20">
+            <a:extLst>
+              <a:ext uri="{FF2B5EF4-FFF2-40B4-BE49-F238E27FC236}">
+                <a16:creationId xmlns:a16="http://schemas.microsoft.com/office/drawing/2014/main" id="{2F9A9233-9CE6-04EF-4255-3584A7F6BE0C}"/>
+              </a:ext>
+            </a:extLst>
+          </p:cNvPr>
+          <p:cNvCxnSpPr>
+            <a:cxnSpLocks/>
+          </p:cNvCxnSpPr>
+          <p:nvPr/>
+        </p:nvCxnSpPr>
+        <p:spPr>
+          <a:xfrm flipH="1">
+            <a:off x="4739268" y="4093139"/>
+            <a:ext cx="2330605" cy="2017724"/>
+          </a:xfrm>
+          <a:prstGeom prst="line">
+            <a:avLst/>
+          </a:prstGeom>
+          <a:ln w="19050">
+            <a:solidFill>
+              <a:srgbClr val="FF0000"/>
+            </a:solidFill>
+          </a:ln>
+        </p:spPr>
+        <p:style>
+          <a:lnRef idx="1">
+            <a:schemeClr val="accent1"/>
+          </a:lnRef>
+          <a:fillRef idx="0">
+            <a:schemeClr val="accent1"/>
+          </a:fillRef>
+          <a:effectRef idx="0">
+            <a:schemeClr val="accent1"/>
+          </a:effectRef>
+          <a:fontRef idx="minor">
+            <a:schemeClr val="tx1"/>
+          </a:fontRef>
+        </p:style>
+      </p:cxnSp>
+      <p:cxnSp>
+        <p:nvCxnSpPr>
+          <p:cNvPr id="23" name="Straight Connector 22">
+            <a:extLst>
+              <a:ext uri="{FF2B5EF4-FFF2-40B4-BE49-F238E27FC236}">
+                <a16:creationId xmlns:a16="http://schemas.microsoft.com/office/drawing/2014/main" id="{C4A89DAE-3E4E-EF5E-5D6A-298B3C0E2628}"/>
+              </a:ext>
+            </a:extLst>
+          </p:cNvPr>
+          <p:cNvCxnSpPr>
+            <a:cxnSpLocks/>
+          </p:cNvCxnSpPr>
+          <p:nvPr/>
+        </p:nvCxnSpPr>
+        <p:spPr>
+          <a:xfrm>
+            <a:off x="4739268" y="6096924"/>
+            <a:ext cx="2241395" cy="371706"/>
+          </a:xfrm>
+          <a:prstGeom prst="line">
+            <a:avLst/>
+          </a:prstGeom>
+          <a:ln w="19050">
+            <a:solidFill>
+              <a:srgbClr val="FF0000"/>
+            </a:solidFill>
+          </a:ln>
+        </p:spPr>
+        <p:style>
+          <a:lnRef idx="1">
+            <a:schemeClr val="accent1"/>
+          </a:lnRef>
+          <a:fillRef idx="0">
+            <a:schemeClr val="accent1"/>
+          </a:fillRef>
+          <a:effectRef idx="0">
+            <a:schemeClr val="accent1"/>
+          </a:effectRef>
+          <a:fontRef idx="minor">
+            <a:schemeClr val="tx1"/>
+          </a:fontRef>
+        </p:style>
+      </p:cxnSp>
+      <p:pic>
+        <p:nvPicPr>
+          <p:cNvPr id="27" name="Picture 26">
+            <a:extLst>
+              <a:ext uri="{FF2B5EF4-FFF2-40B4-BE49-F238E27FC236}">
+                <a16:creationId xmlns:a16="http://schemas.microsoft.com/office/drawing/2014/main" id="{6D2D47F0-83EA-BA99-32D1-2443AFF6B352}"/>
+              </a:ext>
+            </a:extLst>
+          </p:cNvPr>
+          <p:cNvPicPr>
+            <a:picLocks noChangeAspect="1"/>
+          </p:cNvPicPr>
+          <p:nvPr/>
+        </p:nvPicPr>
+        <p:blipFill rotWithShape="1">
+          <a:blip r:embed="rId4"/>
+          <a:srcRect l="2678" r="2523"/>
+          <a:stretch/>
+        </p:blipFill>
+        <p:spPr>
+          <a:xfrm>
+            <a:off x="7069873" y="4093139"/>
+            <a:ext cx="4906537" cy="2400588"/>
+          </a:xfrm>
+          <a:prstGeom prst="rect">
+            <a:avLst/>
+          </a:prstGeom>
+          <a:ln w="3175">
+            <a:solidFill>
+              <a:schemeClr val="tx1"/>
+            </a:solidFill>
+          </a:ln>
+        </p:spPr>
+      </p:pic>
+      <p:pic>
+        <p:nvPicPr>
+          <p:cNvPr id="1026" name="Picture 2" descr="How do I contribute to free5GC? - FAQ - free5GC">
+            <a:extLst>
+              <a:ext uri="{FF2B5EF4-FFF2-40B4-BE49-F238E27FC236}">
+                <a16:creationId xmlns:a16="http://schemas.microsoft.com/office/drawing/2014/main" id="{28AF9904-4F99-3B55-9688-565A2E45F77F}"/>
+              </a:ext>
+            </a:extLst>
+          </p:cNvPr>
+          <p:cNvPicPr>
+            <a:picLocks noChangeAspect="1" noChangeArrowheads="1"/>
+          </p:cNvPicPr>
+          <p:nvPr/>
+        </p:nvPicPr>
+        <p:blipFill>
+          <a:blip r:embed="rId5">
+            <a:extLst>
+              <a:ext uri="{28A0092B-C50C-407E-A947-70E740481C1C}">
+                <a14:useLocalDpi xmlns:a14="http://schemas.microsoft.com/office/drawing/2010/main" val="0"/>
+              </a:ext>
+            </a:extLst>
+          </a:blip>
+          <a:srcRect/>
+          <a:stretch>
+            <a:fillRect/>
+          </a:stretch>
+        </p:blipFill>
+        <p:spPr bwMode="auto">
+          <a:xfrm>
+            <a:off x="7159083" y="4267835"/>
+            <a:ext cx="575682" cy="471224"/>
+          </a:xfrm>
+          <a:prstGeom prst="rect">
+            <a:avLst/>
+          </a:prstGeom>
+          <a:noFill/>
+          <a:extLst>
+            <a:ext uri="{909E8E84-426E-40DD-AFC4-6F175D3DCCD1}">
+              <a14:hiddenFill xmlns:a14="http://schemas.microsoft.com/office/drawing/2010/main">
+                <a:solidFill>
+                  <a:srgbClr val="FFFFFF"/>
+                </a:solidFill>
+              </a14:hiddenFill>
+            </a:ext>
+          </a:extLst>
+        </p:spPr>
+      </p:pic>
+    </p:spTree>
+    <p:extLst>
+      <p:ext uri="{BB962C8B-B14F-4D97-AF65-F5344CB8AC3E}">
+        <p14:creationId xmlns:p14="http://schemas.microsoft.com/office/powerpoint/2010/main" val="2918680542"/>
+      </p:ext>
+    </p:extLst>
+  </p:cSld>
+  <p:clrMapOvr>
+    <a:masterClrMapping/>
+  </p:clrMapOvr>
+</p:sld>
+</file>
+
+<file path=ppt/slides/slide3.xml><?xml version="1.0" encoding="utf-8"?>
+<p:sld xmlns:a="http://schemas.openxmlformats.org/drawingml/2006/main" xmlns:r="http://schemas.openxmlformats.org/officeDocument/2006/relationships" xmlns:p="http://schemas.openxmlformats.org/presentationml/2006/main">
+  <p:cSld>
+    <p:spTree>
+      <p:nvGrpSpPr>
+        <p:cNvPr id="1" name=""/>
+        <p:cNvGrpSpPr/>
+        <p:nvPr/>
+      </p:nvGrpSpPr>
+      <p:grpSpPr>
+        <a:xfrm>
+          <a:off x="0" y="0"/>
+          <a:ext cx="0" cy="0"/>
+          <a:chOff x="0" y="0"/>
+          <a:chExt cx="0" cy="0"/>
+        </a:xfrm>
+      </p:grpSpPr>
+      <p:graphicFrame>
+        <p:nvGraphicFramePr>
+          <p:cNvPr id="5" name="Table 5">
+            <a:extLst>
+              <a:ext uri="{FF2B5EF4-FFF2-40B4-BE49-F238E27FC236}">
+                <a16:creationId xmlns:a16="http://schemas.microsoft.com/office/drawing/2014/main" id="{188C33DA-FCF3-2989-D853-DD38E2FC23FF}"/>
+              </a:ext>
+            </a:extLst>
+          </p:cNvPr>
+          <p:cNvGraphicFramePr>
+            <a:graphicFrameLocks noGrp="1"/>
+          </p:cNvGraphicFramePr>
+          <p:nvPr>
+            <p:extLst>
+              <p:ext uri="{D42A27DB-BD31-4B8C-83A1-F6EECF244321}">
+                <p14:modId xmlns:p14="http://schemas.microsoft.com/office/powerpoint/2010/main" val="1066748596"/>
+              </p:ext>
+            </p:extLst>
+          </p:nvPr>
+        </p:nvGraphicFramePr>
+        <p:xfrm>
+          <a:off x="1184949" y="763981"/>
+          <a:ext cx="9152231" cy="5120640"/>
+        </p:xfrm>
+        <a:graphic>
+          <a:graphicData uri="http://schemas.openxmlformats.org/drawingml/2006/table">
+            <a:tbl>
+              <a:tblPr firstRow="1" bandRow="1">
+                <a:tableStyleId>{5C22544A-7EE6-4342-B048-85BDC9FD1C3A}</a:tableStyleId>
+              </a:tblPr>
+              <a:tblGrid>
+                <a:gridCol w="4394334">
+                  <a:extLst>
+                    <a:ext uri="{9D8B030D-6E8A-4147-A177-3AD203B41FA5}">
+                      <a16:colId xmlns:a16="http://schemas.microsoft.com/office/drawing/2014/main" val="4149870345"/>
+                    </a:ext>
+                  </a:extLst>
+                </a:gridCol>
+                <a:gridCol w="4757897">
+                  <a:extLst>
+                    <a:ext uri="{9D8B030D-6E8A-4147-A177-3AD203B41FA5}">
+                      <a16:colId xmlns:a16="http://schemas.microsoft.com/office/drawing/2014/main" val="3730207817"/>
+                    </a:ext>
+                  </a:extLst>
+                </a:gridCol>
+              </a:tblGrid>
+              <a:tr h="2274726">
+                <a:tc>
+                  <a:txBody>
+                    <a:bodyPr/>
+                    <a:lstStyle/>
+                    <a:p>
+                      <a:r>
+                        <a:rPr lang="en-US" dirty="0">
+                          <a:solidFill>
+                            <a:schemeClr val="tx1"/>
+                          </a:solidFill>
+                        </a:rPr>
+                        <a:t>Strengths </a:t>
+                      </a:r>
+                    </a:p>
+                    <a:p>
+                      <a:endParaRPr lang="en-US" dirty="0">
+                        <a:solidFill>
+                          <a:schemeClr val="tx1"/>
+                        </a:solidFill>
+                      </a:endParaRPr>
+                    </a:p>
+                    <a:p>
+                      <a:pPr marL="285750" indent="-285750">
+                        <a:buFont typeface="Arial" panose="020B0604020202020204" pitchFamily="34" charset="0"/>
+                        <a:buChar char="•"/>
+                      </a:pPr>
+                      <a:r>
+                        <a:rPr lang="en-US" dirty="0">
+                          <a:solidFill>
+                            <a:schemeClr val="tx1"/>
+                          </a:solidFill>
+                        </a:rPr>
+                        <a:t>Low price. </a:t>
+                      </a:r>
+                    </a:p>
+                    <a:p>
+                      <a:pPr marL="285750" indent="-285750">
+                        <a:buFont typeface="Arial" panose="020B0604020202020204" pitchFamily="34" charset="0"/>
+                        <a:buChar char="•"/>
+                      </a:pPr>
+                      <a:r>
+                        <a:rPr lang="en-US" dirty="0">
+                          <a:solidFill>
+                            <a:schemeClr val="tx1"/>
+                          </a:solidFill>
+                        </a:rPr>
+                        <a:t>No need specific hardware required.</a:t>
+                      </a:r>
+                    </a:p>
+                    <a:p>
+                      <a:pPr marL="285750" indent="-285750">
+                        <a:buFont typeface="Arial" panose="020B0604020202020204" pitchFamily="34" charset="0"/>
+                        <a:buChar char="•"/>
+                      </a:pPr>
+                      <a:r>
+                        <a:rPr lang="en-US" dirty="0">
+                          <a:solidFill>
+                            <a:schemeClr val="tx1"/>
+                          </a:solidFill>
+                        </a:rPr>
+                        <a:t>Open Source and flexible for configuration. </a:t>
+                      </a:r>
+                    </a:p>
+                    <a:p>
+                      <a:pPr marL="285750" indent="-285750">
+                        <a:buFont typeface="Arial" panose="020B0604020202020204" pitchFamily="34" charset="0"/>
+                        <a:buChar char="•"/>
+                      </a:pPr>
+                      <a:r>
+                        <a:rPr lang="en-US" dirty="0">
+                          <a:solidFill>
+                            <a:schemeClr val="tx1"/>
+                          </a:solidFill>
+                        </a:rPr>
+                        <a:t>Can fast deploy an isolated  5G environment on OpenStack. </a:t>
+                      </a:r>
+                    </a:p>
+                    <a:p>
+                      <a:pPr marL="0" indent="0">
+                        <a:buFont typeface="Arial" panose="020B0604020202020204" pitchFamily="34" charset="0"/>
+                        <a:buNone/>
+                      </a:pPr>
+                      <a:endParaRPr lang="en-US" dirty="0">
+                        <a:solidFill>
+                          <a:schemeClr val="tx1"/>
+                        </a:solidFill>
+                      </a:endParaRPr>
+                    </a:p>
+                  </a:txBody>
+                  <a:tcPr>
+                    <a:solidFill>
+                      <a:schemeClr val="accent1">
+                        <a:lumMod val="20000"/>
+                        <a:lumOff val="80000"/>
+                      </a:schemeClr>
+                    </a:solidFill>
+                  </a:tcPr>
+                </a:tc>
+                <a:tc>
+                  <a:txBody>
+                    <a:bodyPr/>
+                    <a:lstStyle/>
+                    <a:p>
+                      <a:pPr marL="0" marR="0" lvl="0" indent="0" algn="l" defTabSz="914400" rtl="0" eaLnBrk="1" fontAlgn="auto" latinLnBrk="0" hangingPunct="1">
+                        <a:lnSpc>
+                          <a:spcPct val="100000"/>
+                        </a:lnSpc>
+                        <a:spcBef>
+                          <a:spcPts val="0"/>
+                        </a:spcBef>
+                        <a:spcAft>
+                          <a:spcPts val="0"/>
+                        </a:spcAft>
+                        <a:buClrTx/>
+                        <a:buSzTx/>
+                        <a:buFontTx/>
+                        <a:buNone/>
+                        <a:tabLst/>
+                        <a:defRPr/>
+                      </a:pPr>
+                      <a:r>
+                        <a:rPr lang="en-US" dirty="0">
+                          <a:solidFill>
+                            <a:schemeClr val="tx1"/>
+                          </a:solidFill>
+                        </a:rPr>
+                        <a:t>Weaknesses </a:t>
+                      </a:r>
+                    </a:p>
+                    <a:p>
+                      <a:pPr marL="0" marR="0" lvl="0" indent="0" algn="l" defTabSz="914400" rtl="0" eaLnBrk="1" fontAlgn="auto" latinLnBrk="0" hangingPunct="1">
+                        <a:lnSpc>
+                          <a:spcPct val="100000"/>
+                        </a:lnSpc>
+                        <a:spcBef>
+                          <a:spcPts val="0"/>
+                        </a:spcBef>
+                        <a:spcAft>
+                          <a:spcPts val="0"/>
+                        </a:spcAft>
+                        <a:buClrTx/>
+                        <a:buSzTx/>
+                        <a:buFontTx/>
+                        <a:buNone/>
+                        <a:tabLst/>
+                        <a:defRPr/>
+                      </a:pPr>
+                      <a:endParaRPr lang="en-SG" dirty="0">
+                        <a:solidFill>
+                          <a:schemeClr val="tx1"/>
+                        </a:solidFill>
+                      </a:endParaRPr>
+                    </a:p>
+                    <a:p>
+                      <a:pPr marL="285750" marR="0" lvl="0" indent="-285750" algn="l" defTabSz="914400" rtl="0" eaLnBrk="1" fontAlgn="auto" latinLnBrk="0" hangingPunct="1">
+                        <a:lnSpc>
+                          <a:spcPct val="100000"/>
+                        </a:lnSpc>
+                        <a:spcBef>
+                          <a:spcPts val="0"/>
+                        </a:spcBef>
+                        <a:spcAft>
+                          <a:spcPts val="0"/>
+                        </a:spcAft>
+                        <a:buClrTx/>
+                        <a:buSzTx/>
+                        <a:buFont typeface="Arial" panose="020B0604020202020204" pitchFamily="34" charset="0"/>
+                        <a:buChar char="•"/>
+                        <a:tabLst/>
+                        <a:defRPr/>
+                      </a:pPr>
+                      <a:r>
+                        <a:rPr lang="en-SG" dirty="0">
+                          <a:solidFill>
+                            <a:schemeClr val="tx1"/>
+                          </a:solidFill>
+                        </a:rPr>
+                        <a:t>Simulation situation may not be same as the real 5G vendor’s solution.</a:t>
+                      </a:r>
+                    </a:p>
+                    <a:p>
+                      <a:pPr marL="285750" marR="0" lvl="0" indent="-285750" algn="l" defTabSz="914400" rtl="0" eaLnBrk="1" fontAlgn="auto" latinLnBrk="0" hangingPunct="1">
+                        <a:lnSpc>
+                          <a:spcPct val="100000"/>
+                        </a:lnSpc>
+                        <a:spcBef>
+                          <a:spcPts val="0"/>
+                        </a:spcBef>
+                        <a:spcAft>
+                          <a:spcPts val="0"/>
+                        </a:spcAft>
+                        <a:buClrTx/>
+                        <a:buSzTx/>
+                        <a:buFont typeface="Arial" panose="020B0604020202020204" pitchFamily="34" charset="0"/>
+                        <a:buChar char="•"/>
+                        <a:tabLst/>
+                        <a:defRPr/>
+                      </a:pPr>
+                      <a:r>
+                        <a:rPr lang="en-SG" dirty="0">
+                          <a:solidFill>
+                            <a:schemeClr val="tx1"/>
+                          </a:solidFill>
+                        </a:rPr>
+                        <a:t>Hard to convince market people as currently there is no real-life use case.</a:t>
+                      </a:r>
+                    </a:p>
+                    <a:p>
+                      <a:pPr marL="285750" marR="0" lvl="0" indent="-285750" algn="l" defTabSz="914400" rtl="0" eaLnBrk="1" fontAlgn="auto" latinLnBrk="0" hangingPunct="1">
+                        <a:lnSpc>
+                          <a:spcPct val="100000"/>
+                        </a:lnSpc>
+                        <a:spcBef>
+                          <a:spcPts val="0"/>
+                        </a:spcBef>
+                        <a:spcAft>
+                          <a:spcPts val="0"/>
+                        </a:spcAft>
+                        <a:buClrTx/>
+                        <a:buSzTx/>
+                        <a:buFont typeface="Arial" panose="020B0604020202020204" pitchFamily="34" charset="0"/>
+                        <a:buChar char="•"/>
+                        <a:tabLst/>
+                        <a:defRPr/>
+                      </a:pPr>
+                      <a:r>
+                        <a:rPr lang="en-SG" dirty="0">
+                          <a:solidFill>
+                            <a:schemeClr val="tx1"/>
+                          </a:solidFill>
+                        </a:rPr>
+                        <a:t>Hard to answer the question about why/how the 5G-function is implemented as we don’t hold the IP.</a:t>
+                      </a:r>
+                    </a:p>
+                    <a:p>
+                      <a:pPr marL="285750" marR="0" lvl="0" indent="-285750" algn="l" defTabSz="914400" rtl="0" eaLnBrk="1" fontAlgn="auto" latinLnBrk="0" hangingPunct="1">
+                        <a:lnSpc>
+                          <a:spcPct val="100000"/>
+                        </a:lnSpc>
+                        <a:spcBef>
+                          <a:spcPts val="0"/>
+                        </a:spcBef>
+                        <a:spcAft>
+                          <a:spcPts val="0"/>
+                        </a:spcAft>
+                        <a:buClrTx/>
+                        <a:buSzTx/>
+                        <a:buFont typeface="Arial" panose="020B0604020202020204" pitchFamily="34" charset="0"/>
+                        <a:buChar char="•"/>
+                        <a:tabLst/>
+                        <a:defRPr/>
+                      </a:pPr>
+                      <a:endParaRPr lang="en-US" dirty="0">
+                        <a:solidFill>
+                          <a:schemeClr val="tx1"/>
+                        </a:solidFill>
+                      </a:endParaRPr>
+                    </a:p>
+                  </a:txBody>
+                  <a:tcPr>
+                    <a:solidFill>
+                      <a:schemeClr val="accent2">
+                        <a:lumMod val="40000"/>
+                        <a:lumOff val="60000"/>
+                      </a:schemeClr>
+                    </a:solidFill>
+                  </a:tcPr>
+                </a:tc>
+                <a:extLst>
+                  <a:ext uri="{0D108BD9-81ED-4DB2-BD59-A6C34878D82A}">
+                    <a16:rowId xmlns:a16="http://schemas.microsoft.com/office/drawing/2014/main" val="2634739533"/>
+                  </a:ext>
+                </a:extLst>
+              </a:tr>
+              <a:tr h="2274726">
+                <a:tc>
+                  <a:txBody>
+                    <a:bodyPr/>
+                    <a:lstStyle/>
+                    <a:p>
+                      <a:r>
+                        <a:rPr lang="en-SG" b="1" dirty="0"/>
+                        <a:t>Opportunities</a:t>
+                      </a:r>
+                    </a:p>
+                    <a:p>
+                      <a:endParaRPr lang="en-SG" b="1" dirty="0"/>
+                    </a:p>
+                    <a:p>
+                      <a:pPr marL="285750" indent="-285750">
+                        <a:buFont typeface="Arial" panose="020B0604020202020204" pitchFamily="34" charset="0"/>
+                        <a:buChar char="•"/>
+                      </a:pPr>
+                      <a:r>
+                        <a:rPr lang="en-SG" b="1" dirty="0"/>
+                        <a:t>Free for the research to add their algo in the platform. </a:t>
+                      </a:r>
+                    </a:p>
+                    <a:p>
+                      <a:pPr marL="285750" indent="-285750">
+                        <a:buFont typeface="Arial" panose="020B0604020202020204" pitchFamily="34" charset="0"/>
+                        <a:buChar char="•"/>
+                      </a:pPr>
+                      <a:r>
+                        <a:rPr lang="en-SG" b="1" dirty="0"/>
+                        <a:t>Design different attack and defence simulation (</a:t>
+                      </a:r>
+                      <a:r>
+                        <a:rPr lang="en-SG" b="1"/>
+                        <a:t>can config vulnerable point). </a:t>
+                      </a:r>
+                      <a:endParaRPr lang="en-SG" b="1" dirty="0"/>
+                    </a:p>
+                    <a:p>
+                      <a:pPr marL="285750" indent="-285750">
+                        <a:buFont typeface="Arial" panose="020B0604020202020204" pitchFamily="34" charset="0"/>
+                        <a:buChar char="•"/>
+                      </a:pPr>
+                      <a:r>
+                        <a:rPr lang="en-SG" b="1" dirty="0"/>
+                        <a:t>Customized the 5G environment for cyber event/exercise. </a:t>
+                      </a:r>
+                    </a:p>
+                  </a:txBody>
+                  <a:tcPr>
+                    <a:solidFill>
+                      <a:schemeClr val="accent6">
+                        <a:lumMod val="40000"/>
+                        <a:lumOff val="60000"/>
+                      </a:schemeClr>
+                    </a:solidFill>
+                  </a:tcPr>
+                </a:tc>
+                <a:tc>
+                  <a:txBody>
+                    <a:bodyPr/>
+                    <a:lstStyle/>
+                    <a:p>
+                      <a:r>
+                        <a:rPr lang="en-SG" b="1" dirty="0"/>
+                        <a:t>Threats</a:t>
+                      </a:r>
+                    </a:p>
+                    <a:p>
+                      <a:endParaRPr lang="en-SG" b="1" dirty="0"/>
+                    </a:p>
+                    <a:p>
+                      <a:r>
+                        <a:rPr lang="en-SG" b="1" dirty="0"/>
+                        <a:t>Several Opensource 5G project: </a:t>
+                      </a:r>
+                    </a:p>
+                    <a:p>
+                      <a:pPr marL="285750" indent="-285750">
+                        <a:buFont typeface="Arial" panose="020B0604020202020204" pitchFamily="34" charset="0"/>
+                        <a:buChar char="•"/>
+                      </a:pPr>
+                      <a:r>
+                        <a:rPr lang="en-SG" b="1" dirty="0"/>
+                        <a:t>my5G / my5G-RANTester</a:t>
+                      </a:r>
+                    </a:p>
+                    <a:p>
+                      <a:pPr marL="285750" marR="0" lvl="0" indent="-285750" algn="l" defTabSz="914400" rtl="0" eaLnBrk="1" fontAlgn="auto" latinLnBrk="0" hangingPunct="1">
+                        <a:lnSpc>
+                          <a:spcPct val="100000"/>
+                        </a:lnSpc>
+                        <a:spcBef>
+                          <a:spcPts val="0"/>
+                        </a:spcBef>
+                        <a:spcAft>
+                          <a:spcPts val="0"/>
+                        </a:spcAft>
+                        <a:buClrTx/>
+                        <a:buSzTx/>
+                        <a:buFont typeface="Arial" panose="020B0604020202020204" pitchFamily="34" charset="0"/>
+                        <a:buChar char="•"/>
+                        <a:tabLst/>
+                        <a:defRPr/>
+                      </a:pPr>
+                      <a:r>
+                        <a:rPr lang="en-SG" sz="1800" b="1" i="0" kern="1200" dirty="0">
+                          <a:solidFill>
+                            <a:schemeClr val="dk1"/>
+                          </a:solidFill>
+                          <a:effectLst/>
+                          <a:latin typeface="+mn-lt"/>
+                          <a:ea typeface="+mn-ea"/>
+                          <a:cs typeface="+mn-cs"/>
+                        </a:rPr>
+                        <a:t>K-</a:t>
+                      </a:r>
+                      <a:r>
+                        <a:rPr lang="en-SG" sz="1800" b="1" i="0" kern="1200" dirty="0" err="1">
+                          <a:solidFill>
+                            <a:schemeClr val="dk1"/>
+                          </a:solidFill>
+                          <a:effectLst/>
+                          <a:latin typeface="+mn-lt"/>
+                          <a:ea typeface="+mn-ea"/>
+                          <a:cs typeface="+mn-cs"/>
+                        </a:rPr>
+                        <a:t>SimNet</a:t>
+                      </a:r>
+                      <a:r>
+                        <a:rPr lang="en-SG" sz="1800" b="1" i="0" kern="1200" dirty="0">
+                          <a:solidFill>
+                            <a:schemeClr val="dk1"/>
+                          </a:solidFill>
+                          <a:effectLst/>
+                          <a:latin typeface="+mn-lt"/>
+                          <a:ea typeface="+mn-ea"/>
+                          <a:cs typeface="+mn-cs"/>
+                        </a:rPr>
+                        <a:t>/ 5G Network Simulator (5G)</a:t>
+                      </a:r>
+                    </a:p>
+                    <a:p>
+                      <a:pPr marL="285750" marR="0" lvl="0" indent="-285750" algn="l" defTabSz="914400" rtl="0" eaLnBrk="1" fontAlgn="auto" latinLnBrk="0" hangingPunct="1">
+                        <a:lnSpc>
+                          <a:spcPct val="100000"/>
+                        </a:lnSpc>
+                        <a:spcBef>
+                          <a:spcPts val="0"/>
+                        </a:spcBef>
+                        <a:spcAft>
+                          <a:spcPts val="0"/>
+                        </a:spcAft>
+                        <a:buClrTx/>
+                        <a:buSzTx/>
+                        <a:buFont typeface="Arial" panose="020B0604020202020204" pitchFamily="34" charset="0"/>
+                        <a:buChar char="•"/>
+                        <a:tabLst/>
+                        <a:defRPr/>
+                      </a:pPr>
+                      <a:r>
+                        <a:rPr lang="en-US" sz="1800" b="1" i="0" kern="1200" dirty="0">
+                          <a:solidFill>
+                            <a:schemeClr val="dk1"/>
+                          </a:solidFill>
+                          <a:effectLst/>
+                          <a:latin typeface="+mn-lt"/>
+                          <a:ea typeface="+mn-ea"/>
+                          <a:cs typeface="+mn-cs"/>
+                        </a:rPr>
+                        <a:t>UERANSIM/ 5G UE and RAN (</a:t>
+                      </a:r>
+                      <a:r>
+                        <a:rPr lang="en-US" sz="1800" b="1" i="0" kern="1200" dirty="0" err="1">
+                          <a:solidFill>
+                            <a:schemeClr val="dk1"/>
+                          </a:solidFill>
+                          <a:effectLst/>
+                          <a:latin typeface="+mn-lt"/>
+                          <a:ea typeface="+mn-ea"/>
+                          <a:cs typeface="+mn-cs"/>
+                        </a:rPr>
+                        <a:t>gNodeB</a:t>
+                      </a:r>
+                      <a:r>
+                        <a:rPr lang="en-US" sz="1800" b="1" i="0" kern="1200" dirty="0">
+                          <a:solidFill>
+                            <a:schemeClr val="dk1"/>
+                          </a:solidFill>
+                          <a:effectLst/>
+                          <a:latin typeface="+mn-lt"/>
+                          <a:ea typeface="+mn-ea"/>
+                          <a:cs typeface="+mn-cs"/>
+                        </a:rPr>
+                        <a:t>) simulator</a:t>
+                      </a:r>
+                      <a:endParaRPr lang="en-SG" sz="1800" b="1" i="0" kern="1200" dirty="0">
+                        <a:solidFill>
+                          <a:schemeClr val="dk1"/>
+                        </a:solidFill>
+                        <a:effectLst/>
+                        <a:latin typeface="+mn-lt"/>
+                        <a:ea typeface="+mn-ea"/>
+                        <a:cs typeface="+mn-cs"/>
+                      </a:endParaRPr>
+                    </a:p>
+                    <a:p>
+                      <a:endParaRPr lang="en-SG" b="1" dirty="0"/>
+                    </a:p>
+                  </a:txBody>
+                  <a:tcPr>
+                    <a:solidFill>
+                      <a:schemeClr val="accent4">
+                        <a:lumMod val="40000"/>
+                        <a:lumOff val="60000"/>
+                      </a:schemeClr>
+                    </a:solidFill>
+                  </a:tcPr>
+                </a:tc>
+                <a:extLst>
+                  <a:ext uri="{0D108BD9-81ED-4DB2-BD59-A6C34878D82A}">
+                    <a16:rowId xmlns:a16="http://schemas.microsoft.com/office/drawing/2014/main" val="630623173"/>
+                  </a:ext>
+                </a:extLst>
+              </a:tr>
+            </a:tbl>
+          </a:graphicData>
+        </a:graphic>
+      </p:graphicFrame>
+    </p:spTree>
+    <p:extLst>
+      <p:ext uri="{BB962C8B-B14F-4D97-AF65-F5344CB8AC3E}">
+        <p14:creationId xmlns:p14="http://schemas.microsoft.com/office/powerpoint/2010/main" val="1659775420"/>
+      </p:ext>
+    </p:extLst>
+  </p:cSld>
+  <p:clrMapOvr>
+    <a:masterClrMapping/>
+  </p:clrMapOvr>
+</p:sld>
+</file>
+
 <file path=ppt/theme/theme1.xml><?xml version="1.0" encoding="utf-8"?>
 <a:theme xmlns:a="http://schemas.openxmlformats.org/drawingml/2006/main" name="Office Theme">
   <a:themeElements>

</xml_diff>

<commit_message>
Added the 5G protocol diagram.
</commit_message>
<xml_diff>
--- a/doc/designDoc.pptx
+++ b/doc/designDoc.pptx
@@ -4585,7 +4585,7 @@
           <p:nvPr>
             <p:extLst>
               <p:ext uri="{D42A27DB-BD31-4B8C-83A1-F6EECF244321}">
-                <p14:modId xmlns:p14="http://schemas.microsoft.com/office/powerpoint/2010/main" val="1066748596"/>
+                <p14:modId xmlns:p14="http://schemas.microsoft.com/office/powerpoint/2010/main" val="703927670"/>
               </p:ext>
             </p:extLst>
           </p:nvPr>
@@ -4922,13 +4922,8 @@
                       </a:pPr>
                       <a:r>
                         <a:rPr lang="en-SG" b="1" dirty="0"/>
-                        <a:t>Design different attack and defence simulation (</a:t>
+                        <a:t>Design different attack and defence simulation (can config vulnerable point). </a:t>
                       </a:r>
-                      <a:r>
-                        <a:rPr lang="en-SG" b="1"/>
-                        <a:t>can config vulnerable point). </a:t>
-                      </a:r>
-                      <a:endParaRPr lang="en-SG" b="1" dirty="0"/>
                     </a:p>
                     <a:p>
                       <a:pPr marL="285750" indent="-285750">

</xml_diff>